<commit_message>
Updated configuration files for batch processing, including folder paths and source links; enhanced image validation size limits in API definitions; added yt-dlp dependency; modified PowerPoint templates.
</commit_message>
<xml_diff>
--- a/Scripts/templates/I2V Comparison Template.pptx
+++ b/Scripts/templates/I2V Comparison Template.pptx
@@ -200,7 +200,7 @@
           <a:p>
             <a:fld id="{B5D6417E-267F-B340-921F-2BE1F4386BD8}" type="datetimeFigureOut">
               <a:rPr lang="en-TW" smtClean="0"/>
-              <a:t>2025/8/27</a:t>
+              <a:t>2025/10/2</a:t>
             </a:fld>
             <a:endParaRPr lang="en-TW"/>
           </a:p>
@@ -617,7 +617,7 @@
           <a:p>
             <a:fld id="{1B18B556-6596-E04A-9A94-BF47DB4EF23C}" type="datetimeFigureOut">
               <a:rPr lang="en-TW" smtClean="0"/>
-              <a:t>2025/8/27</a:t>
+              <a:t>2025/10/2</a:t>
             </a:fld>
             <a:endParaRPr lang="en-TW"/>
           </a:p>
@@ -930,7 +930,7 @@
           <a:p>
             <a:fld id="{1B18B556-6596-E04A-9A94-BF47DB4EF23C}" type="datetimeFigureOut">
               <a:rPr lang="en-TW" smtClean="0"/>
-              <a:t>2025/8/27</a:t>
+              <a:t>2025/10/2</a:t>
             </a:fld>
             <a:endParaRPr lang="en-TW"/>
           </a:p>
@@ -1223,7 +1223,7 @@
           <a:p>
             <a:fld id="{1B18B556-6596-E04A-9A94-BF47DB4EF23C}" type="datetimeFigureOut">
               <a:rPr lang="en-TW" smtClean="0"/>
-              <a:t>2025/8/27</a:t>
+              <a:t>2025/10/2</a:t>
             </a:fld>
             <a:endParaRPr lang="en-TW"/>
           </a:p>
@@ -1423,7 +1423,7 @@
           <a:p>
             <a:fld id="{1B18B556-6596-E04A-9A94-BF47DB4EF23C}" type="datetimeFigureOut">
               <a:rPr lang="en-TW" smtClean="0"/>
-              <a:t>2025/8/27</a:t>
+              <a:t>2025/10/2</a:t>
             </a:fld>
             <a:endParaRPr lang="en-TW"/>
           </a:p>
@@ -1633,7 +1633,7 @@
           <a:p>
             <a:fld id="{1B18B556-6596-E04A-9A94-BF47DB4EF23C}" type="datetimeFigureOut">
               <a:rPr lang="en-TW" smtClean="0"/>
-              <a:t>2025/8/27</a:t>
+              <a:t>2025/10/2</a:t>
             </a:fld>
             <a:endParaRPr lang="en-TW"/>
           </a:p>
@@ -1833,7 +1833,7 @@
           <a:p>
             <a:fld id="{1B18B556-6596-E04A-9A94-BF47DB4EF23C}" type="datetimeFigureOut">
               <a:rPr lang="en-TW" smtClean="0"/>
-              <a:t>2025/8/27</a:t>
+              <a:t>2025/10/2</a:t>
             </a:fld>
             <a:endParaRPr lang="en-TW"/>
           </a:p>
@@ -2109,7 +2109,7 @@
           <a:p>
             <a:fld id="{1B18B556-6596-E04A-9A94-BF47DB4EF23C}" type="datetimeFigureOut">
               <a:rPr lang="en-TW" smtClean="0"/>
-              <a:t>2025/8/27</a:t>
+              <a:t>2025/10/2</a:t>
             </a:fld>
             <a:endParaRPr lang="en-TW"/>
           </a:p>
@@ -2377,7 +2377,7 @@
           <a:p>
             <a:fld id="{1B18B556-6596-E04A-9A94-BF47DB4EF23C}" type="datetimeFigureOut">
               <a:rPr lang="en-TW" smtClean="0"/>
-              <a:t>2025/8/27</a:t>
+              <a:t>2025/10/2</a:t>
             </a:fld>
             <a:endParaRPr lang="en-TW"/>
           </a:p>
@@ -2792,7 +2792,7 @@
           <a:p>
             <a:fld id="{1B18B556-6596-E04A-9A94-BF47DB4EF23C}" type="datetimeFigureOut">
               <a:rPr lang="en-TW" smtClean="0"/>
-              <a:t>2025/8/27</a:t>
+              <a:t>2025/10/2</a:t>
             </a:fld>
             <a:endParaRPr lang="en-TW"/>
           </a:p>
@@ -2934,7 +2934,7 @@
           <a:p>
             <a:fld id="{1B18B556-6596-E04A-9A94-BF47DB4EF23C}" type="datetimeFigureOut">
               <a:rPr lang="en-TW" smtClean="0"/>
-              <a:t>2025/8/27</a:t>
+              <a:t>2025/10/2</a:t>
             </a:fld>
             <a:endParaRPr lang="en-TW"/>
           </a:p>
@@ -3746,7 +3746,7 @@
           <a:p>
             <a:fld id="{1B18B556-6596-E04A-9A94-BF47DB4EF23C}" type="datetimeFigureOut">
               <a:rPr lang="en-TW" smtClean="0"/>
-              <a:t>2025/8/27</a:t>
+              <a:t>2025/10/2</a:t>
             </a:fld>
             <a:endParaRPr lang="en-TW"/>
           </a:p>
@@ -3989,7 +3989,7 @@
           <a:p>
             <a:fld id="{1B18B556-6596-E04A-9A94-BF47DB4EF23C}" type="datetimeFigureOut">
               <a:rPr lang="en-TW" smtClean="0"/>
-              <a:t>2025/8/27</a:t>
+              <a:t>2025/10/2</a:t>
             </a:fld>
             <a:endParaRPr lang="en-TW"/>
           </a:p>
@@ -4584,7 +4584,7 @@
             <p:ph idx="1"/>
             <p:extLst>
               <p:ext uri="{D42A27DB-BD31-4B8C-83A1-F6EECF244321}">
-                <p14:modId xmlns:p14="http://schemas.microsoft.com/office/powerpoint/2010/main" val="2634581216"/>
+                <p14:modId xmlns:p14="http://schemas.microsoft.com/office/powerpoint/2010/main" val="1803801692"/>
               </p:ext>
             </p:extLst>
           </p:nvPr>
@@ -4654,7 +4654,10 @@
                     <a:lstStyle/>
                     <a:p>
                       <a:pPr algn="ctr"/>
-                      <a:endParaRPr lang="en-TW" dirty="0"/>
+                      <a:r>
+                        <a:rPr lang="en-TW" dirty="0"/>
+                        <a:t>Pass符合prompt</a:t>
+                      </a:r>
                     </a:p>
                   </a:txBody>
                   <a:tcPr anchor="ctr"/>
@@ -4665,7 +4668,10 @@
                     <a:lstStyle/>
                     <a:p>
                       <a:pPr algn="ctr"/>
-                      <a:endParaRPr lang="en-TW" dirty="0"/>
+                      <a:r>
+                        <a:rPr lang="en-TW" dirty="0"/>
+                        <a:t>Pass不合prompt</a:t>
+                      </a:r>
                     </a:p>
                   </a:txBody>
                   <a:tcPr anchor="ctr"/>
@@ -4676,7 +4682,10 @@
                     <a:lstStyle/>
                     <a:p>
                       <a:pPr algn="ctr"/>
-                      <a:endParaRPr lang="en-TW"/>
+                      <a:r>
+                        <a:rPr lang="en-TW" dirty="0"/>
+                        <a:t>Note</a:t>
+                      </a:r>
                     </a:p>
                   </a:txBody>
                   <a:tcPr anchor="ctr"/>
@@ -4687,7 +4696,19 @@
                     <a:lstStyle/>
                     <a:p>
                       <a:pPr algn="ctr"/>
-                      <a:endParaRPr lang="en-TW"/>
+                      <a:r>
+                        <a:rPr lang="en-TW" dirty="0"/>
+                        <a:t>PM</a:t>
+                      </a:r>
+                      <a:r>
+                        <a:rPr lang="zh-TW" altLang="en-US" dirty="0"/>
+                        <a:t> </a:t>
+                      </a:r>
+                      <a:r>
+                        <a:rPr lang="en-US" altLang="zh-TW" dirty="0"/>
+                        <a:t>Comment</a:t>
+                      </a:r>
+                      <a:endParaRPr lang="en-TW" dirty="0"/>
                     </a:p>
                   </a:txBody>
                   <a:tcPr anchor="ctr"/>

</xml_diff>